<commit_message>
Add reading for next lecture to lecture 7 slides
</commit_message>
<xml_diff>
--- a/lectures/07-Requirements.pptx
+++ b/lectures/07-Requirements.pptx
@@ -151,7 +151,7 @@
     <p1510:client id="{2D4D2690-A47C-4E55-AF69-DC13A47B88D6}" v="5085" dt="2022-09-14T05:08:58.347"/>
     <p1510:client id="{2F2A020C-6E62-4C4F-9BB9-2A9D328C96E1}" v="3" dt="2022-09-12T18:29:20.111"/>
     <p1510:client id="{50D03C1E-BBC1-418D-89D4-7F75C9CEAEC4}" v="1" dt="2022-08-19T00:57:26.382"/>
-    <p1510:client id="{7AA067B4-4948-44E9-B39B-801624FD759B}" v="2445" dt="2022-09-14T19:31:50.497"/>
+    <p1510:client id="{7AA067B4-4948-44E9-B39B-801624FD759B}" v="2457" dt="2022-09-14T19:37:31.446"/>
     <p1510:client id="{A5B581C4-A03D-4029-9AB1-449396172C58}" v="2975" dt="2022-08-11T18:44:54.195"/>
     <p1510:client id="{BD3F2711-C48B-4365-A5B8-2C5149827483}" v="18" dt="2022-06-30T03:32:15.211"/>
   </p1510:revLst>
@@ -6862,7 +6862,12 @@
             <p:ph idx="1"/>
           </p:nvPr>
         </p:nvSpPr>
-        <p:spPr/>
+        <p:spPr>
+          <a:xfrm>
+            <a:off x="838200" y="1825625"/>
+            <a:ext cx="10515600" cy="5033126"/>
+          </a:xfrm>
+        </p:spPr>
         <p:txBody>
           <a:bodyPr vert="horz" lIns="91440" tIns="45720" rIns="91440" bIns="45720" rtlCol="0" anchor="t">
             <a:normAutofit fontScale="77500" lnSpcReduction="20000"/>
@@ -6971,7 +6976,22 @@
               </a:rPr>
               <a:t>Object Oriented Design. Edward Yourdon and Peter Coad. 1991. Prentice Hall.</a:t>
             </a:r>
-            <a:endParaRPr lang="en-US">
+          </a:p>
+          <a:p>
+            <a:endParaRPr lang="en-US" dirty="0">
+              <a:ea typeface="Calibri" panose="020F0502020204030204"/>
+              <a:cs typeface="Calibri"/>
+            </a:endParaRPr>
+          </a:p>
+          <a:p>
+            <a:r>
+              <a:rPr lang="en-US" i="1" dirty="0">
+                <a:ea typeface="Calibri" panose="020F0502020204030204"/>
+                <a:cs typeface="Calibri"/>
+              </a:rPr>
+              <a:t>Reading for next lecture: Pressman Ch 6, 25</a:t>
+            </a:r>
+            <a:endParaRPr lang="en-US" dirty="0">
               <a:ea typeface="Calibri" panose="020F0502020204030204"/>
               <a:cs typeface="Calibri"/>
             </a:endParaRPr>

</xml_diff>